<commit_message>
gracias philip und philipp
</commit_message>
<xml_diff>
--- a/AI Ridge Regression/Ridge Regression.pptx
+++ b/AI Ridge Regression/Ridge Regression.pptx
@@ -105,6 +105,11 @@
       </a:defRPr>
     </a:lvl9pPr>
   </p:defaultTextStyle>
+  <p:extLst>
+    <p:ext uri="{EFAFB233-063F-42B5-8137-9DF3F51BA10A}">
+      <p15:sldGuideLst xmlns:p15="http://schemas.microsoft.com/office/powerpoint/2012/main"/>
+    </p:ext>
+  </p:extLst>
 </p:presentation>
 </file>
 
@@ -3405,6 +3410,13 @@
           <a:lstStyle/>
           <a:p>
             <a:r>
+              <a:rPr lang="en-US" sz="2000"/>
+              <a:t>The difference between ridge and lasso regression is that it tends to make coefficients to absolute zero as compared to Ridge which never sets the value of coefficient to absolute zero.</a:t>
+            </a:r>
+            <a:endParaRPr lang="de-AT" sz="2000" dirty="0"/>
+          </a:p>
+          <a:p>
+            <a:r>
               <a:rPr lang="de-AT" sz="2000" dirty="0" err="1"/>
               <a:t>Used</a:t>
             </a:r>
@@ -3913,7 +3925,7 @@
               <a:t>less</a:t>
             </a:r>
             <a:r>
-              <a:rPr lang="de-AT" sz="1800">
+              <a:rPr lang="de-AT" sz="1800" dirty="0">
                 <a:solidFill>
                   <a:srgbClr val="333333"/>
                 </a:solidFill>
@@ -3921,7 +3933,7 @@
               </a:rPr>
               <a:t> sensitiv</a:t>
             </a:r>
-            <a:endParaRPr lang="de-AT" sz="1800" b="0" i="0">
+            <a:endParaRPr lang="de-AT" sz="1800" b="0" i="0" dirty="0">
               <a:solidFill>
                 <a:srgbClr val="333333"/>
               </a:solidFill>

</xml_diff>